<commit_message>
merged input from Giuseppe
</commit_message>
<xml_diff>
--- a/ietf123-Madrid/Slides/chair-slides-bmwg-ippm.pptx
+++ b/ietf123-Madrid/Slides/chair-slides-bmwg-ippm.pptx
@@ -19278,48 +19278,112 @@
           <a:lstStyle/>
           <a:p>
             <a:r>
-              <a:rPr lang="de-CH" dirty="0"/>
-              <a:t>Text</a:t>
+              <a:rPr lang="de-CH" sz="1400" b="1" dirty="0"/>
+              <a:t>draft-ietf-bmwg-mlrsearch </a:t>
             </a:r>
-            <a:endParaRPr lang="en-001" dirty="0"/>
+            <a:r>
+              <a:rPr lang="en-US" sz="1400" dirty="0"/>
+              <a:t>to be submitted to IESG for publication</a:t>
+            </a:r>
           </a:p>
           <a:p>
             <a:pPr lvl="1"/>
             <a:r>
-              <a:rPr lang="de-CH" dirty="0"/>
-              <a:t>Text</a:t>
+              <a:rPr lang="de-CH" sz="1400" dirty="0"/>
+              <a:t>AD Review addressed in the latest version </a:t>
             </a:r>
-            <a:endParaRPr lang="en-001" dirty="0"/>
           </a:p>
           <a:p>
             <a:r>
-              <a:rPr lang="de-CH" dirty="0"/>
-              <a:t>Text</a:t>
+              <a:rPr lang="de-CH" sz="1400" b="1" dirty="0"/>
+              <a:t>draft-ietf-bmwg-sr-bench-meth </a:t>
             </a:r>
-            <a:endParaRPr lang="en-001" dirty="0"/>
+            <a:r>
+              <a:rPr lang="de-CH" sz="1400" dirty="0"/>
+              <a:t>and </a:t>
+            </a:r>
+            <a:r>
+              <a:rPr lang="de-CH" sz="1400" b="1" dirty="0"/>
+              <a:t>draft-ietf-bmwg-network-tester-cfg</a:t>
+            </a:r>
+            <a:r>
+              <a:rPr lang="de-CH" sz="1400" dirty="0"/>
+              <a:t> preparing for the WGLC</a:t>
+            </a:r>
           </a:p>
           <a:p>
             <a:pPr lvl="1"/>
             <a:r>
-              <a:rPr lang="de-CH" dirty="0"/>
-              <a:t>Text</a:t>
+              <a:rPr lang="de-CH" sz="1400" dirty="0"/>
+              <a:t>Milestones to be revised accordingly</a:t>
             </a:r>
-            <a:endParaRPr lang="en-001" dirty="0"/>
           </a:p>
           <a:p>
             <a:r>
-              <a:rPr lang="de-CH" dirty="0"/>
-              <a:t>Text</a:t>
+              <a:rPr lang="de-CH" sz="1400" b="1" dirty="0"/>
+              <a:t>draft-cprjgf-bmwg-powerbench</a:t>
             </a:r>
-            <a:endParaRPr lang="en-001" dirty="0"/>
+            <a:r>
+              <a:rPr lang="de-CH" sz="1400" dirty="0"/>
+              <a:t>, </a:t>
+            </a:r>
+            <a:r>
+              <a:rPr lang="de-CH" sz="1400" b="1" dirty="0"/>
+              <a:t>draft-chen-bmwg-savnet-sav-benchmarking</a:t>
+            </a:r>
+            <a:r>
+              <a:rPr lang="de-CH" sz="1400" dirty="0"/>
+              <a:t> and </a:t>
+            </a:r>
+            <a:r>
+              <a:rPr lang="de-CH" sz="1400" b="1" dirty="0"/>
+              <a:t>draft-lencse-bmwg-multiple-ip-addresses</a:t>
+            </a:r>
+            <a:r>
+              <a:rPr lang="de-CH" sz="1400" dirty="0"/>
+              <a:t> candidate for adoption</a:t>
+            </a:r>
           </a:p>
           <a:p>
             <a:pPr lvl="1"/>
             <a:r>
-              <a:rPr lang="de-CH" dirty="0"/>
-              <a:t>Text</a:t>
+              <a:rPr lang="de-CH" sz="1400" dirty="0"/>
+              <a:t>R</a:t>
             </a:r>
-            <a:endParaRPr lang="en-001" dirty="0"/>
+            <a:r>
+              <a:rPr lang="de-CH" sz="1400"/>
+              <a:t>ecent </a:t>
+            </a:r>
+            <a:r>
+              <a:rPr lang="de-CH" sz="1400" dirty="0"/>
+              <a:t>discussion on the mailing list</a:t>
+            </a:r>
+          </a:p>
+          <a:p>
+            <a:r>
+              <a:rPr lang="de-CH" sz="1400" dirty="0"/>
+              <a:t>Proposals keep coming (see </a:t>
+            </a:r>
+            <a:r>
+              <a:rPr lang="de-CH" sz="1400" dirty="0">
+                <a:hlinkClick r:id="rId3"/>
+              </a:rPr>
+              <a:t>https://datatracker.ietf.org/wg/bmwg/documents/</a:t>
+            </a:r>
+            <a:r>
+              <a:rPr lang="de-CH" sz="1400" dirty="0"/>
+              <a:t>)</a:t>
+            </a:r>
+          </a:p>
+          <a:p>
+            <a:r>
+              <a:rPr lang="de-CH" sz="1400" dirty="0"/>
+              <a:t>Some discussion for revisiting BMWG RFCs in order to update RFC 2544</a:t>
+            </a:r>
+          </a:p>
+          <a:p>
+            <a:pPr lvl="1"/>
+            <a:endParaRPr lang="en-001" sz="1400" dirty="0"/>
           </a:p>
         </p:txBody>
       </p:sp>
@@ -19715,60 +19779,8 @@
           <a:p>
             <a:pPr lvl="1"/>
             <a:r>
-              <a:rPr lang="de-CH" dirty="0" err="1"/>
-              <a:t>Received</a:t>
-            </a:r>
-            <a:r>
               <a:rPr lang="de-CH" dirty="0"/>
-              <a:t> and </a:t>
-            </a:r>
-            <a:r>
-              <a:rPr lang="de-CH" dirty="0" err="1"/>
-              <a:t>addressed</a:t>
-            </a:r>
-            <a:r>
-              <a:rPr lang="de-CH" dirty="0"/>
-              <a:t> </a:t>
-            </a:r>
-            <a:r>
-              <a:rPr lang="de-CH" dirty="0" err="1"/>
-              <a:t>good</a:t>
-            </a:r>
-            <a:r>
-              <a:rPr lang="de-CH" dirty="0"/>
-              <a:t> </a:t>
-            </a:r>
-            <a:r>
-              <a:rPr lang="de-CH" dirty="0" err="1"/>
-              <a:t>feedback</a:t>
-            </a:r>
-            <a:r>
-              <a:rPr lang="de-CH"/>
-              <a:t>. Looking </a:t>
-            </a:r>
-            <a:r>
-              <a:rPr lang="de-CH" dirty="0" err="1"/>
-              <a:t>forward</a:t>
-            </a:r>
-            <a:r>
-              <a:rPr lang="de-CH" dirty="0"/>
-              <a:t> </a:t>
-            </a:r>
-            <a:r>
-              <a:rPr lang="de-CH" dirty="0" err="1"/>
-              <a:t>for</a:t>
-            </a:r>
-            <a:r>
-              <a:rPr lang="de-CH" dirty="0"/>
-              <a:t> </a:t>
-            </a:r>
-            <a:r>
-              <a:rPr lang="de-CH" dirty="0" err="1"/>
-              <a:t>more</a:t>
-            </a:r>
-            <a:r>
-              <a:rPr lang="de-CH" dirty="0"/>
-              <a:t>.</a:t>
+              <a:t>Received and addressed good feedback. Looking forward for more.</a:t>
             </a:r>
             <a:endParaRPr lang="en-001" dirty="0"/>
           </a:p>
@@ -22270,10 +22282,29 @@
                 <a:cs typeface="Inter"/>
                 <a:sym typeface="Inter"/>
               </a:rPr>
-              <a:t>The scope of BMWG has been extended to develop methods for virtual network functions (VNF) and their unique supporting infrastructure (such as SDN Controllers and </a:t>
+              <a:t>The set of relevant benchmarks will be developed with input from the community of users (network operators and testing organizations) and from those affected by the benchmarks when they are published (networking and test equipment manufacturers). </a:t>
             </a:r>
+          </a:p>
+          <a:p>
+            <a:pPr marL="457200" marR="0" lvl="0" indent="-311150" algn="l" rtl="0">
+              <a:lnSpc>
+                <a:spcPct val="115000"/>
+              </a:lnSpc>
+              <a:spcBef>
+                <a:spcPts val="600"/>
+              </a:spcBef>
+              <a:spcAft>
+                <a:spcPts val="0"/>
+              </a:spcAft>
+              <a:buClr>
+                <a:srgbClr val="434343"/>
+              </a:buClr>
+              <a:buSzPts val="1300"/>
+              <a:buFont typeface="Inter"/>
+              <a:buChar char="●"/>
+            </a:pPr>
             <a:r>
-              <a:rPr lang="en-US" sz="1300" dirty="0" err="1">
+              <a:rPr lang="en-US" sz="1300" dirty="0">
                 <a:solidFill>
                   <a:srgbClr val="434343"/>
                 </a:solidFill>
@@ -22282,19 +22313,7 @@
                 <a:cs typeface="Inter"/>
                 <a:sym typeface="Inter"/>
               </a:rPr>
-              <a:t>vSwitches</a:t>
-            </a:r>
-            <a:r>
-              <a:rPr lang="en-US" sz="1300" dirty="0">
-                <a:solidFill>
-                  <a:srgbClr val="434343"/>
-                </a:solidFill>
-                <a:latin typeface="Inter"/>
-                <a:ea typeface="Inter"/>
-                <a:cs typeface="Inter"/>
-                <a:sym typeface="Inter"/>
-              </a:rPr>
-              <a:t>). Benchmarks for platform capacity and performance characteristics of virtual routers, firewalls (and other security functions), signaling control gateways, and other forms of gateways are included. The benchmarks will foster comparisons between physical and virtual network functions, and also cover unique features of Network Function Virtualization systems. Also, with the emergence of virtualized test systems, specifications for test system calibration are also in-scope.</a:t>
+              <a:t>The scope of the BMWG is limited to the characterization of implementations of various internetworking technologies using controlled stimuli in a laboratory environment. Said differently, the BMWG does not attempt to produce benchmarks for live, operational networks.</a:t>
             </a:r>
           </a:p>
           <a:p>
@@ -23908,6 +23927,14 @@
 </file>
 
 <file path=customXml/item1.xml><?xml version="1.0" encoding="utf-8"?>
+<p:properties xmlns:p="http://schemas.microsoft.com/office/2006/metadata/properties" xmlns:xsi="http://www.w3.org/2001/XMLSchema-instance" xmlns:pc="http://schemas.microsoft.com/office/infopath/2007/PartnerControls">
+  <documentManagement>
+    <_activity xmlns="3e5e162a-5953-4fde-83b3-9639e6ab13bb" xsi:nil="true"/>
+  </documentManagement>
+</p:properties>
+</file>
+
+<file path=customXml/item2.xml><?xml version="1.0" encoding="utf-8"?>
 <ct:contentTypeSchema xmlns:ct="http://schemas.microsoft.com/office/2006/metadata/contentType" xmlns:ma="http://schemas.microsoft.com/office/2006/metadata/properties/metaAttributes" ct:_="" ma:_="" ma:contentTypeName="Dokument" ma:contentTypeID="0x01010028792A905D4FBE4781303B372FFF56B7" ma:contentTypeVersion="18" ma:contentTypeDescription="Ein neues Dokument erstellen." ma:contentTypeScope="" ma:versionID="1bed101c48ab8d637c0f10f3a19033d6">
   <xsd:schema xmlns:xsd="http://www.w3.org/2001/XMLSchema" xmlns:xs="http://www.w3.org/2001/XMLSchema" xmlns:p="http://schemas.microsoft.com/office/2006/metadata/properties" xmlns:ns3="3e5e162a-5953-4fde-83b3-9639e6ab13bb" xmlns:ns4="266fa233-377d-43d6-82a1-e70154e55ff7" targetNamespace="http://schemas.microsoft.com/office/2006/metadata/properties" ma:root="true" ma:fieldsID="ad54ca06dfd6fdd081bd33575dcf7e57" ns3:_="" ns4:_="">
     <xsd:import namespace="3e5e162a-5953-4fde-83b3-9639e6ab13bb"/>
@@ -24160,7 +24187,7 @@
 </ct:contentTypeSchema>
 </file>
 
-<file path=customXml/item2.xml><?xml version="1.0" encoding="utf-8"?>
+<file path=customXml/item3.xml><?xml version="1.0" encoding="utf-8"?>
 <?mso-contentType ?>
 <FormTemplates xmlns="http://schemas.microsoft.com/sharepoint/v3/contenttype/forms">
   <Display>DocumentLibraryForm</Display>
@@ -24169,15 +24196,24 @@
 </FormTemplates>
 </file>
 
-<file path=customXml/item3.xml><?xml version="1.0" encoding="utf-8"?>
-<p:properties xmlns:p="http://schemas.microsoft.com/office/2006/metadata/properties" xmlns:xsi="http://www.w3.org/2001/XMLSchema-instance" xmlns:pc="http://schemas.microsoft.com/office/infopath/2007/PartnerControls">
-  <documentManagement>
-    <_activity xmlns="3e5e162a-5953-4fde-83b3-9639e6ab13bb" xsi:nil="true"/>
-  </documentManagement>
-</p:properties>
+<file path=customXml/itemProps1.xml><?xml version="1.0" encoding="utf-8"?>
+<ds:datastoreItem xmlns:ds="http://schemas.openxmlformats.org/officeDocument/2006/customXml" ds:itemID="{3D7021EF-4D3D-4708-92FB-F2CD02CEF7A1}">
+  <ds:schemaRefs>
+    <ds:schemaRef ds:uri="http://schemas.openxmlformats.org/package/2006/metadata/core-properties"/>
+    <ds:schemaRef ds:uri="http://schemas.microsoft.com/office/2006/documentManagement/types"/>
+    <ds:schemaRef ds:uri="http://schemas.microsoft.com/office/infopath/2007/PartnerControls"/>
+    <ds:schemaRef ds:uri="http://purl.org/dc/elements/1.1/"/>
+    <ds:schemaRef ds:uri="http://schemas.microsoft.com/office/2006/metadata/properties"/>
+    <ds:schemaRef ds:uri="3e5e162a-5953-4fde-83b3-9639e6ab13bb"/>
+    <ds:schemaRef ds:uri="266fa233-377d-43d6-82a1-e70154e55ff7"/>
+    <ds:schemaRef ds:uri="http://purl.org/dc/terms/"/>
+    <ds:schemaRef ds:uri="http://www.w3.org/XML/1998/namespace"/>
+    <ds:schemaRef ds:uri="http://purl.org/dc/dcmitype/"/>
+  </ds:schemaRefs>
+</ds:datastoreItem>
 </file>
 
-<file path=customXml/itemProps1.xml><?xml version="1.0" encoding="utf-8"?>
+<file path=customXml/itemProps2.xml><?xml version="1.0" encoding="utf-8"?>
 <ds:datastoreItem xmlns:ds="http://schemas.openxmlformats.org/officeDocument/2006/customXml" ds:itemID="{F4805544-B524-4E4A-B7C1-6ABFC599928D}">
   <ds:schemaRefs>
     <ds:schemaRef ds:uri="http://schemas.microsoft.com/office/2006/metadata/contentType"/>
@@ -24196,27 +24232,10 @@
 </ds:datastoreItem>
 </file>
 
-<file path=customXml/itemProps2.xml><?xml version="1.0" encoding="utf-8"?>
+<file path=customXml/itemProps3.xml><?xml version="1.0" encoding="utf-8"?>
 <ds:datastoreItem xmlns:ds="http://schemas.openxmlformats.org/officeDocument/2006/customXml" ds:itemID="{9104BBC9-6B71-4DC1-A0E0-1E198363AC7F}">
   <ds:schemaRefs>
     <ds:schemaRef ds:uri="http://schemas.microsoft.com/sharepoint/v3/contenttype/forms"/>
-  </ds:schemaRefs>
-</ds:datastoreItem>
-</file>
-
-<file path=customXml/itemProps3.xml><?xml version="1.0" encoding="utf-8"?>
-<ds:datastoreItem xmlns:ds="http://schemas.openxmlformats.org/officeDocument/2006/customXml" ds:itemID="{3D7021EF-4D3D-4708-92FB-F2CD02CEF7A1}">
-  <ds:schemaRefs>
-    <ds:schemaRef ds:uri="http://schemas.openxmlformats.org/package/2006/metadata/core-properties"/>
-    <ds:schemaRef ds:uri="http://schemas.microsoft.com/office/2006/documentManagement/types"/>
-    <ds:schemaRef ds:uri="http://schemas.microsoft.com/office/infopath/2007/PartnerControls"/>
-    <ds:schemaRef ds:uri="http://purl.org/dc/elements/1.1/"/>
-    <ds:schemaRef ds:uri="http://schemas.microsoft.com/office/2006/metadata/properties"/>
-    <ds:schemaRef ds:uri="3e5e162a-5953-4fde-83b3-9639e6ab13bb"/>
-    <ds:schemaRef ds:uri="266fa233-377d-43d6-82a1-e70154e55ff7"/>
-    <ds:schemaRef ds:uri="http://purl.org/dc/terms/"/>
-    <ds:schemaRef ds:uri="http://www.w3.org/XML/1998/namespace"/>
-    <ds:schemaRef ds:uri="http://purl.org/dc/dcmitype/"/>
   </ds:schemaRefs>
 </ds:datastoreItem>
 </file>

</xml_diff>

<commit_message>
Update date on first slide
</commit_message>
<xml_diff>
--- a/ietf123-Madrid/Slides/chair-slides-bmwg-ippm.pptx
+++ b/ietf123-Madrid/Slides/chair-slides-bmwg-ippm.pptx
@@ -322,10 +322,25 @@
   <pc:docChgLst>
     <pc:chgData name="Marcus Ihlar" userId="3466507a-8f95-47f2-ae1b-ce7d6ca611a4" providerId="ADAL" clId="{AED546ED-D998-4FD7-8756-673BE2DDCF49}"/>
     <pc:docChg chg="modSld">
-      <pc:chgData name="Marcus Ihlar" userId="3466507a-8f95-47f2-ae1b-ce7d6ca611a4" providerId="ADAL" clId="{AED546ED-D998-4FD7-8756-673BE2DDCF49}" dt="2025-07-16T10:18:57.833" v="8" actId="20577"/>
+      <pc:chgData name="Marcus Ihlar" userId="3466507a-8f95-47f2-ae1b-ce7d6ca611a4" providerId="ADAL" clId="{AED546ED-D998-4FD7-8756-673BE2DDCF49}" dt="2025-07-16T10:35:22.434" v="10" actId="20577"/>
       <pc:docMkLst>
         <pc:docMk/>
       </pc:docMkLst>
+      <pc:sldChg chg="modSp mod">
+        <pc:chgData name="Marcus Ihlar" userId="3466507a-8f95-47f2-ae1b-ce7d6ca611a4" providerId="ADAL" clId="{AED546ED-D998-4FD7-8756-673BE2DDCF49}" dt="2025-07-16T10:35:22.434" v="10" actId="20577"/>
+        <pc:sldMkLst>
+          <pc:docMk/>
+          <pc:sldMk cId="0" sldId="256"/>
+        </pc:sldMkLst>
+        <pc:spChg chg="mod">
+          <ac:chgData name="Marcus Ihlar" userId="3466507a-8f95-47f2-ae1b-ce7d6ca611a4" providerId="ADAL" clId="{AED546ED-D998-4FD7-8756-673BE2DDCF49}" dt="2025-07-16T10:35:22.434" v="10" actId="20577"/>
+          <ac:spMkLst>
+            <pc:docMk/>
+            <pc:sldMk cId="0" sldId="256"/>
+            <ac:spMk id="100" creationId="{00000000-0000-0000-0000-000000000000}"/>
+          </ac:spMkLst>
+        </pc:spChg>
+      </pc:sldChg>
       <pc:sldChg chg="modSp mod">
         <pc:chgData name="Marcus Ihlar" userId="3466507a-8f95-47f2-ae1b-ce7d6ca611a4" providerId="ADAL" clId="{AED546ED-D998-4FD7-8756-673BE2DDCF49}" dt="2025-07-16T10:18:57.833" v="8" actId="20577"/>
         <pc:sldMkLst>
@@ -18843,7 +18858,7 @@
               <a:buNone/>
             </a:pPr>
             <a:r>
-              <a:rPr lang="en-US" sz="2100" dirty="0">
+              <a:rPr lang="en-US" sz="2100">
                 <a:solidFill>
                   <a:srgbClr val="FFFFFF"/>
                 </a:solidFill>
@@ -18852,7 +18867,19 @@
                 <a:cs typeface="Inter"/>
                 <a:sym typeface="Inter"/>
               </a:rPr>
-              <a:t>24 July 2025</a:t>
+              <a:t>21 </a:t>
+            </a:r>
+            <a:r>
+              <a:rPr lang="en-US" sz="2100" dirty="0">
+                <a:solidFill>
+                  <a:srgbClr val="FFFFFF"/>
+                </a:solidFill>
+                <a:latin typeface="Inter"/>
+                <a:ea typeface="Inter"/>
+                <a:cs typeface="Inter"/>
+                <a:sym typeface="Inter"/>
+              </a:rPr>
+              <a:t>July 2025</a:t>
             </a:r>
             <a:endParaRPr sz="1100" dirty="0">
               <a:latin typeface="Inter"/>
@@ -21701,7 +21728,7 @@
         <p:fade/>
       </p:transition>
     </mc:Choice>
-    <mc:Fallback xmlns:ahyp="http://schemas.microsoft.com/office/drawing/2018/hyperlinkcolor" xmlns:p15="http://schemas.microsoft.com/office/powerpoint/2012/main" xmlns:com="http://schemas.openxmlformats.org/drawingml/2006/compatibility" xmlns:pvml="urn:schemas-microsoft-com:office:powerpoint" xmlns:v="urn:schemas-microsoft-com:vml" xmlns:o="urn:schemas-microsoft-com:office:office" xmlns:dgm="http://schemas.openxmlformats.org/drawingml/2006/diagram" xmlns:c="http://schemas.openxmlformats.org/drawingml/2006/chart" xmlns:mv="urn:schemas-microsoft-com:mac:vml" xmlns="">
+    <mc:Fallback xmlns="" xmlns:mv="urn:schemas-microsoft-com:mac:vml" xmlns:c="http://schemas.openxmlformats.org/drawingml/2006/chart" xmlns:dgm="http://schemas.openxmlformats.org/drawingml/2006/diagram" xmlns:o="urn:schemas-microsoft-com:office:office" xmlns:v="urn:schemas-microsoft-com:vml" xmlns:pvml="urn:schemas-microsoft-com:office:powerpoint" xmlns:com="http://schemas.openxmlformats.org/drawingml/2006/compatibility" xmlns:p15="http://schemas.microsoft.com/office/powerpoint/2012/main" xmlns:ahyp="http://schemas.microsoft.com/office/drawing/2018/hyperlinkcolor">
       <p:transition spd="slow">
         <p:fade/>
       </p:transition>
@@ -22036,7 +22063,7 @@
         <p:fade/>
       </p:transition>
     </mc:Choice>
-    <mc:Fallback xmlns:ahyp="http://schemas.microsoft.com/office/drawing/2018/hyperlinkcolor" xmlns:p15="http://schemas.microsoft.com/office/powerpoint/2012/main" xmlns:com="http://schemas.openxmlformats.org/drawingml/2006/compatibility" xmlns:pvml="urn:schemas-microsoft-com:office:powerpoint" xmlns:v="urn:schemas-microsoft-com:vml" xmlns:o="urn:schemas-microsoft-com:office:office" xmlns:dgm="http://schemas.openxmlformats.org/drawingml/2006/diagram" xmlns:c="http://schemas.openxmlformats.org/drawingml/2006/chart" xmlns:mv="urn:schemas-microsoft-com:mac:vml" xmlns="">
+    <mc:Fallback xmlns="" xmlns:mv="urn:schemas-microsoft-com:mac:vml" xmlns:c="http://schemas.openxmlformats.org/drawingml/2006/chart" xmlns:dgm="http://schemas.openxmlformats.org/drawingml/2006/diagram" xmlns:o="urn:schemas-microsoft-com:office:office" xmlns:v="urn:schemas-microsoft-com:vml" xmlns:pvml="urn:schemas-microsoft-com:office:powerpoint" xmlns:com="http://schemas.openxmlformats.org/drawingml/2006/compatibility" xmlns:p15="http://schemas.microsoft.com/office/powerpoint/2012/main" xmlns:ahyp="http://schemas.microsoft.com/office/drawing/2018/hyperlinkcolor">
       <p:transition spd="slow">
         <p:fade/>
       </p:transition>
@@ -25185,20 +25212,20 @@
 </file>
 
 <file path=customXml/item2.xml><?xml version="1.0" encoding="utf-8"?>
-<p:properties xmlns:p="http://schemas.microsoft.com/office/2006/metadata/properties" xmlns:xsi="http://www.w3.org/2001/XMLSchema-instance" xmlns:pc="http://schemas.microsoft.com/office/infopath/2007/PartnerControls">
-  <documentManagement>
-    <_activity xmlns="3e5e162a-5953-4fde-83b3-9639e6ab13bb" xsi:nil="true"/>
-  </documentManagement>
-</p:properties>
-</file>
-
-<file path=customXml/item3.xml><?xml version="1.0" encoding="utf-8"?>
 <?mso-contentType ?>
 <FormTemplates xmlns="http://schemas.microsoft.com/sharepoint/v3/contenttype/forms">
   <Display>DocumentLibraryForm</Display>
   <Edit>DocumentLibraryForm</Edit>
   <New>DocumentLibraryForm</New>
 </FormTemplates>
+</file>
+
+<file path=customXml/item3.xml><?xml version="1.0" encoding="utf-8"?>
+<p:properties xmlns:p="http://schemas.microsoft.com/office/2006/metadata/properties" xmlns:xsi="http://www.w3.org/2001/XMLSchema-instance" xmlns:pc="http://schemas.microsoft.com/office/infopath/2007/PartnerControls">
+  <documentManagement>
+    <_activity xmlns="3e5e162a-5953-4fde-83b3-9639e6ab13bb" xsi:nil="true"/>
+  </documentManagement>
+</p:properties>
 </file>
 
 <file path=customXml/itemProps1.xml><?xml version="1.0" encoding="utf-8"?>
@@ -25221,6 +25248,14 @@
 </file>
 
 <file path=customXml/itemProps2.xml><?xml version="1.0" encoding="utf-8"?>
+<ds:datastoreItem xmlns:ds="http://schemas.openxmlformats.org/officeDocument/2006/customXml" ds:itemID="{9104BBC9-6B71-4DC1-A0E0-1E198363AC7F}">
+  <ds:schemaRefs>
+    <ds:schemaRef ds:uri="http://schemas.microsoft.com/sharepoint/v3/contenttype/forms"/>
+  </ds:schemaRefs>
+</ds:datastoreItem>
+</file>
+
+<file path=customXml/itemProps3.xml><?xml version="1.0" encoding="utf-8"?>
 <ds:datastoreItem xmlns:ds="http://schemas.openxmlformats.org/officeDocument/2006/customXml" ds:itemID="{3D7021EF-4D3D-4708-92FB-F2CD02CEF7A1}">
   <ds:schemaRefs>
     <ds:schemaRef ds:uri="http://schemas.openxmlformats.org/package/2006/metadata/core-properties"/>
@@ -25237,14 +25272,6 @@
 </ds:datastoreItem>
 </file>
 
-<file path=customXml/itemProps3.xml><?xml version="1.0" encoding="utf-8"?>
-<ds:datastoreItem xmlns:ds="http://schemas.openxmlformats.org/officeDocument/2006/customXml" ds:itemID="{9104BBC9-6B71-4DC1-A0E0-1E198363AC7F}">
-  <ds:schemaRefs>
-    <ds:schemaRef ds:uri="http://schemas.microsoft.com/sharepoint/v3/contenttype/forms"/>
-  </ds:schemaRefs>
-</ds:datastoreItem>
-</file>
-
 <file path=docMetadata/LabelInfo.xml><?xml version="1.0" encoding="utf-8"?>
 <clbl:labelList xmlns:clbl="http://schemas.microsoft.com/office/2020/mipLabelMetadata">
   <clbl:label id="{2e1fccfb-80ca-4fe1-a574-1516544edb53}" enabled="1" method="Standard" siteId="{364e5b87-c1c7-420d-9bee-c35d19b557a1}" removed="0"/>

</xml_diff>

<commit_message>
updated bmwg-ippm agenda and removed bmwg slides from ippm session
</commit_message>
<xml_diff>
--- a/ietf123-Madrid/Slides/chair-slides-bmwg-ippm.pptx
+++ b/ietf123-Madrid/Slides/chair-slides-bmwg-ippm.pptx
@@ -361,7 +361,7 @@
   <pc:docChgLst>
     <pc:chgData name="Graf Thomas, SCS-INI-NET-VNC-E2E" userId="487bc3e3-9ce7-4cdd-b7b4-8899ea88d289" providerId="ADAL" clId="{4403439A-50EC-49D8-B7F6-3D7264685FDE}"/>
     <pc:docChg chg="undo custSel addSld modSld sldOrd">
-      <pc:chgData name="Graf Thomas, SCS-INI-NET-VNC-E2E" userId="487bc3e3-9ce7-4cdd-b7b4-8899ea88d289" providerId="ADAL" clId="{4403439A-50EC-49D8-B7F6-3D7264685FDE}" dt="2025-07-15T09:01:50.650" v="1407" actId="20577"/>
+      <pc:chgData name="Graf Thomas, SCS-INI-NET-VNC-E2E" userId="487bc3e3-9ce7-4cdd-b7b4-8899ea88d289" providerId="ADAL" clId="{4403439A-50EC-49D8-B7F6-3D7264685FDE}" dt="2025-07-21T05:25:01.641" v="1423" actId="1076"/>
       <pc:docMkLst>
         <pc:docMk/>
       </pc:docMkLst>
@@ -418,7 +418,7 @@
         </pc:spChg>
       </pc:sldChg>
       <pc:sldChg chg="addSp delSp modSp mod">
-        <pc:chgData name="Graf Thomas, SCS-INI-NET-VNC-E2E" userId="487bc3e3-9ce7-4cdd-b7b4-8899ea88d289" providerId="ADAL" clId="{4403439A-50EC-49D8-B7F6-3D7264685FDE}" dt="2025-07-14T15:38:01.551" v="754" actId="1076"/>
+        <pc:chgData name="Graf Thomas, SCS-INI-NET-VNC-E2E" userId="487bc3e3-9ce7-4cdd-b7b4-8899ea88d289" providerId="ADAL" clId="{4403439A-50EC-49D8-B7F6-3D7264685FDE}" dt="2025-07-21T05:25:01.641" v="1423" actId="1076"/>
         <pc:sldMkLst>
           <pc:docMk/>
           <pc:sldMk cId="2332748115" sldId="263"/>
@@ -431,12 +431,28 @@
             <ac:spMk id="2" creationId="{0B9E15DC-F076-98D2-1BDF-BC01FEC9047B}"/>
           </ac:spMkLst>
         </pc:spChg>
-        <pc:picChg chg="add mod">
-          <ac:chgData name="Graf Thomas, SCS-INI-NET-VNC-E2E" userId="487bc3e3-9ce7-4cdd-b7b4-8899ea88d289" providerId="ADAL" clId="{4403439A-50EC-49D8-B7F6-3D7264685FDE}" dt="2025-07-14T15:38:01.551" v="754" actId="1076"/>
+        <pc:picChg chg="add del mod">
+          <ac:chgData name="Graf Thomas, SCS-INI-NET-VNC-E2E" userId="487bc3e3-9ce7-4cdd-b7b4-8899ea88d289" providerId="ADAL" clId="{4403439A-50EC-49D8-B7F6-3D7264685FDE}" dt="2025-07-21T05:24:59.612" v="1422" actId="478"/>
           <ac:picMkLst>
             <pc:docMk/>
             <pc:sldMk cId="2332748115" sldId="263"/>
             <ac:picMk id="5" creationId="{D3B1A1F3-3D81-6490-3FFD-0EF242AB0EF3}"/>
+          </ac:picMkLst>
+        </pc:picChg>
+        <pc:picChg chg="add del mod">
+          <ac:chgData name="Graf Thomas, SCS-INI-NET-VNC-E2E" userId="487bc3e3-9ce7-4cdd-b7b4-8899ea88d289" providerId="ADAL" clId="{4403439A-50EC-49D8-B7F6-3D7264685FDE}" dt="2025-07-21T05:24:18.513" v="1411" actId="478"/>
+          <ac:picMkLst>
+            <pc:docMk/>
+            <pc:sldMk cId="2332748115" sldId="263"/>
+            <ac:picMk id="6" creationId="{399F01CF-D8ED-6B9B-6F68-E9E3EDFB133E}"/>
+          </ac:picMkLst>
+        </pc:picChg>
+        <pc:picChg chg="add mod">
+          <ac:chgData name="Graf Thomas, SCS-INI-NET-VNC-E2E" userId="487bc3e3-9ce7-4cdd-b7b4-8899ea88d289" providerId="ADAL" clId="{4403439A-50EC-49D8-B7F6-3D7264685FDE}" dt="2025-07-21T05:25:01.641" v="1423" actId="1076"/>
+          <ac:picMkLst>
+            <pc:docMk/>
+            <pc:sldMk cId="2332748115" sldId="263"/>
+            <ac:picMk id="8" creationId="{0FE2E727-241A-266F-6298-ED3732DB7159}"/>
           </ac:picMkLst>
         </pc:picChg>
       </pc:sldChg>
@@ -21728,7 +21744,7 @@
         <p:fade/>
       </p:transition>
     </mc:Choice>
-    <mc:Fallback xmlns="" xmlns:mv="urn:schemas-microsoft-com:mac:vml" xmlns:c="http://schemas.openxmlformats.org/drawingml/2006/chart" xmlns:dgm="http://schemas.openxmlformats.org/drawingml/2006/diagram" xmlns:o="urn:schemas-microsoft-com:office:office" xmlns:v="urn:schemas-microsoft-com:vml" xmlns:pvml="urn:schemas-microsoft-com:office:powerpoint" xmlns:com="http://schemas.openxmlformats.org/drawingml/2006/compatibility" xmlns:p15="http://schemas.microsoft.com/office/powerpoint/2012/main" xmlns:ahyp="http://schemas.microsoft.com/office/drawing/2018/hyperlinkcolor">
+    <mc:Fallback xmlns:ahyp="http://schemas.microsoft.com/office/drawing/2018/hyperlinkcolor" xmlns:p15="http://schemas.microsoft.com/office/powerpoint/2012/main" xmlns:com="http://schemas.openxmlformats.org/drawingml/2006/compatibility" xmlns:pvml="urn:schemas-microsoft-com:office:powerpoint" xmlns:v="urn:schemas-microsoft-com:vml" xmlns:o="urn:schemas-microsoft-com:office:office" xmlns:dgm="http://schemas.openxmlformats.org/drawingml/2006/diagram" xmlns:c="http://schemas.openxmlformats.org/drawingml/2006/chart" xmlns:mv="urn:schemas-microsoft-com:mac:vml" xmlns="">
       <p:transition spd="slow">
         <p:fade/>
       </p:transition>
@@ -22063,7 +22079,7 @@
         <p:fade/>
       </p:transition>
     </mc:Choice>
-    <mc:Fallback xmlns="" xmlns:mv="urn:schemas-microsoft-com:mac:vml" xmlns:c="http://schemas.openxmlformats.org/drawingml/2006/chart" xmlns:dgm="http://schemas.openxmlformats.org/drawingml/2006/diagram" xmlns:o="urn:schemas-microsoft-com:office:office" xmlns:v="urn:schemas-microsoft-com:vml" xmlns:pvml="urn:schemas-microsoft-com:office:powerpoint" xmlns:com="http://schemas.openxmlformats.org/drawingml/2006/compatibility" xmlns:p15="http://schemas.microsoft.com/office/powerpoint/2012/main" xmlns:ahyp="http://schemas.microsoft.com/office/drawing/2018/hyperlinkcolor">
+    <mc:Fallback xmlns:ahyp="http://schemas.microsoft.com/office/drawing/2018/hyperlinkcolor" xmlns:p15="http://schemas.microsoft.com/office/powerpoint/2012/main" xmlns:com="http://schemas.openxmlformats.org/drawingml/2006/compatibility" xmlns:pvml="urn:schemas-microsoft-com:office:powerpoint" xmlns:v="urn:schemas-microsoft-com:vml" xmlns:o="urn:schemas-microsoft-com:office:office" xmlns:dgm="http://schemas.openxmlformats.org/drawingml/2006/diagram" xmlns:c="http://schemas.openxmlformats.org/drawingml/2006/chart" xmlns:mv="urn:schemas-microsoft-com:mac:vml" xmlns="">
       <p:transition spd="slow">
         <p:fade/>
       </p:transition>
@@ -24074,10 +24090,10 @@
       </p:sp>
       <p:pic>
         <p:nvPicPr>
-          <p:cNvPr id="5" name="Picture 4">
+          <p:cNvPr id="8" name="Picture 7">
             <a:extLst>
               <a:ext uri="{FF2B5EF4-FFF2-40B4-BE49-F238E27FC236}">
-                <a16:creationId xmlns:a16="http://schemas.microsoft.com/office/drawing/2014/main" id="{D3B1A1F3-3D81-6490-3FFD-0EF242AB0EF3}"/>
+                <a16:creationId xmlns:a16="http://schemas.microsoft.com/office/drawing/2014/main" id="{0FE2E727-241A-266F-6298-ED3732DB7159}"/>
               </a:ext>
             </a:extLst>
           </p:cNvPr>
@@ -24094,8 +24110,8 @@
         </p:blipFill>
         <p:spPr>
           <a:xfrm>
-            <a:off x="471900" y="1906418"/>
-            <a:ext cx="5980508" cy="3034445"/>
+            <a:off x="471900" y="1935218"/>
+            <a:ext cx="5489700" cy="3047730"/>
           </a:xfrm>
           <a:prstGeom prst="rect">
             <a:avLst/>
@@ -24959,6 +24975,23 @@
 </file>
 
 <file path=customXml/item1.xml><?xml version="1.0" encoding="utf-8"?>
+<p:properties xmlns:p="http://schemas.microsoft.com/office/2006/metadata/properties" xmlns:xsi="http://www.w3.org/2001/XMLSchema-instance" xmlns:pc="http://schemas.microsoft.com/office/infopath/2007/PartnerControls">
+  <documentManagement>
+    <_activity xmlns="3e5e162a-5953-4fde-83b3-9639e6ab13bb" xsi:nil="true"/>
+  </documentManagement>
+</p:properties>
+</file>
+
+<file path=customXml/item2.xml><?xml version="1.0" encoding="utf-8"?>
+<?mso-contentType ?>
+<FormTemplates xmlns="http://schemas.microsoft.com/sharepoint/v3/contenttype/forms">
+  <Display>DocumentLibraryForm</Display>
+  <Edit>DocumentLibraryForm</Edit>
+  <New>DocumentLibraryForm</New>
+</FormTemplates>
+</file>
+
+<file path=customXml/item3.xml><?xml version="1.0" encoding="utf-8"?>
 <ct:contentTypeSchema xmlns:ct="http://schemas.microsoft.com/office/2006/metadata/contentType" xmlns:ma="http://schemas.microsoft.com/office/2006/metadata/properties/metaAttributes" ct:_="" ma:_="" ma:contentTypeName="Dokument" ma:contentTypeID="0x01010028792A905D4FBE4781303B372FFF56B7" ma:contentTypeVersion="18" ma:contentTypeDescription="Ein neues Dokument erstellen." ma:contentTypeScope="" ma:versionID="1bed101c48ab8d637c0f10f3a19033d6">
   <xsd:schema xmlns:xsd="http://www.w3.org/2001/XMLSchema" xmlns:xs="http://www.w3.org/2001/XMLSchema" xmlns:p="http://schemas.microsoft.com/office/2006/metadata/properties" xmlns:ns3="3e5e162a-5953-4fde-83b3-9639e6ab13bb" xmlns:ns4="266fa233-377d-43d6-82a1-e70154e55ff7" targetNamespace="http://schemas.microsoft.com/office/2006/metadata/properties" ma:root="true" ma:fieldsID="ad54ca06dfd6fdd081bd33575dcf7e57" ns3:_="" ns4:_="">
     <xsd:import namespace="3e5e162a-5953-4fde-83b3-9639e6ab13bb"/>
@@ -25211,24 +25244,32 @@
 </ct:contentTypeSchema>
 </file>
 
-<file path=customXml/item2.xml><?xml version="1.0" encoding="utf-8"?>
-<?mso-contentType ?>
-<FormTemplates xmlns="http://schemas.microsoft.com/sharepoint/v3/contenttype/forms">
-  <Display>DocumentLibraryForm</Display>
-  <Edit>DocumentLibraryForm</Edit>
-  <New>DocumentLibraryForm</New>
-</FormTemplates>
+<file path=customXml/itemProps1.xml><?xml version="1.0" encoding="utf-8"?>
+<ds:datastoreItem xmlns:ds="http://schemas.openxmlformats.org/officeDocument/2006/customXml" ds:itemID="{3D7021EF-4D3D-4708-92FB-F2CD02CEF7A1}">
+  <ds:schemaRefs>
+    <ds:schemaRef ds:uri="http://schemas.openxmlformats.org/package/2006/metadata/core-properties"/>
+    <ds:schemaRef ds:uri="http://schemas.microsoft.com/office/2006/documentManagement/types"/>
+    <ds:schemaRef ds:uri="http://schemas.microsoft.com/office/infopath/2007/PartnerControls"/>
+    <ds:schemaRef ds:uri="http://purl.org/dc/elements/1.1/"/>
+    <ds:schemaRef ds:uri="http://schemas.microsoft.com/office/2006/metadata/properties"/>
+    <ds:schemaRef ds:uri="3e5e162a-5953-4fde-83b3-9639e6ab13bb"/>
+    <ds:schemaRef ds:uri="266fa233-377d-43d6-82a1-e70154e55ff7"/>
+    <ds:schemaRef ds:uri="http://purl.org/dc/terms/"/>
+    <ds:schemaRef ds:uri="http://www.w3.org/XML/1998/namespace"/>
+    <ds:schemaRef ds:uri="http://purl.org/dc/dcmitype/"/>
+  </ds:schemaRefs>
+</ds:datastoreItem>
 </file>
 
-<file path=customXml/item3.xml><?xml version="1.0" encoding="utf-8"?>
-<p:properties xmlns:p="http://schemas.microsoft.com/office/2006/metadata/properties" xmlns:xsi="http://www.w3.org/2001/XMLSchema-instance" xmlns:pc="http://schemas.microsoft.com/office/infopath/2007/PartnerControls">
-  <documentManagement>
-    <_activity xmlns="3e5e162a-5953-4fde-83b3-9639e6ab13bb" xsi:nil="true"/>
-  </documentManagement>
-</p:properties>
+<file path=customXml/itemProps2.xml><?xml version="1.0" encoding="utf-8"?>
+<ds:datastoreItem xmlns:ds="http://schemas.openxmlformats.org/officeDocument/2006/customXml" ds:itemID="{9104BBC9-6B71-4DC1-A0E0-1E198363AC7F}">
+  <ds:schemaRefs>
+    <ds:schemaRef ds:uri="http://schemas.microsoft.com/sharepoint/v3/contenttype/forms"/>
+  </ds:schemaRefs>
+</ds:datastoreItem>
 </file>
 
-<file path=customXml/itemProps1.xml><?xml version="1.0" encoding="utf-8"?>
+<file path=customXml/itemProps3.xml><?xml version="1.0" encoding="utf-8"?>
 <ds:datastoreItem xmlns:ds="http://schemas.openxmlformats.org/officeDocument/2006/customXml" ds:itemID="{F4805544-B524-4E4A-B7C1-6ABFC599928D}">
   <ds:schemaRefs>
     <ds:schemaRef ds:uri="http://schemas.microsoft.com/office/2006/metadata/contentType"/>
@@ -25247,31 +25288,6 @@
 </ds:datastoreItem>
 </file>
 
-<file path=customXml/itemProps2.xml><?xml version="1.0" encoding="utf-8"?>
-<ds:datastoreItem xmlns:ds="http://schemas.openxmlformats.org/officeDocument/2006/customXml" ds:itemID="{9104BBC9-6B71-4DC1-A0E0-1E198363AC7F}">
-  <ds:schemaRefs>
-    <ds:schemaRef ds:uri="http://schemas.microsoft.com/sharepoint/v3/contenttype/forms"/>
-  </ds:schemaRefs>
-</ds:datastoreItem>
-</file>
-
-<file path=customXml/itemProps3.xml><?xml version="1.0" encoding="utf-8"?>
-<ds:datastoreItem xmlns:ds="http://schemas.openxmlformats.org/officeDocument/2006/customXml" ds:itemID="{3D7021EF-4D3D-4708-92FB-F2CD02CEF7A1}">
-  <ds:schemaRefs>
-    <ds:schemaRef ds:uri="http://schemas.openxmlformats.org/package/2006/metadata/core-properties"/>
-    <ds:schemaRef ds:uri="http://schemas.microsoft.com/office/2006/documentManagement/types"/>
-    <ds:schemaRef ds:uri="http://schemas.microsoft.com/office/infopath/2007/PartnerControls"/>
-    <ds:schemaRef ds:uri="http://purl.org/dc/elements/1.1/"/>
-    <ds:schemaRef ds:uri="http://schemas.microsoft.com/office/2006/metadata/properties"/>
-    <ds:schemaRef ds:uri="3e5e162a-5953-4fde-83b3-9639e6ab13bb"/>
-    <ds:schemaRef ds:uri="266fa233-377d-43d6-82a1-e70154e55ff7"/>
-    <ds:schemaRef ds:uri="http://purl.org/dc/terms/"/>
-    <ds:schemaRef ds:uri="http://www.w3.org/XML/1998/namespace"/>
-    <ds:schemaRef ds:uri="http://purl.org/dc/dcmitype/"/>
-  </ds:schemaRefs>
-</ds:datastoreItem>
-</file>
-
 <file path=docMetadata/LabelInfo.xml><?xml version="1.0" encoding="utf-8"?>
 <clbl:labelList xmlns:clbl="http://schemas.microsoft.com/office/2020/mipLabelMetadata">
   <clbl:label id="{2e1fccfb-80ca-4fe1-a574-1516544edb53}" enabled="1" method="Standard" siteId="{364e5b87-c1c7-420d-9bee-c35d19b557a1}" removed="0"/>

</xml_diff>